<commit_message>
docs : screens game
</commit_message>
<xml_diff>
--- a/docs/ecrans-du-jeu.pptx
+++ b/docs/ecrans-du-jeu.pptx
@@ -7,9 +7,10 @@
   <p:sldIdLst>
     <p:sldId id="256" r:id="rId2"/>
     <p:sldId id="257" r:id="rId3"/>
-    <p:sldId id="259" r:id="rId4"/>
-    <p:sldId id="258" r:id="rId5"/>
-    <p:sldId id="260" r:id="rId6"/>
+    <p:sldId id="262" r:id="rId4"/>
+    <p:sldId id="263" r:id="rId5"/>
+    <p:sldId id="258" r:id="rId6"/>
+    <p:sldId id="260" r:id="rId7"/>
   </p:sldIdLst>
   <p:sldSz cx="9144000" cy="6858000" type="screen4x3"/>
   <p:notesSz cx="6858000" cy="9144000"/>
@@ -3112,16 +3113,22 @@
         <p:spPr>
           <a:xfrm>
             <a:off x="829816" y="1075139"/>
-            <a:ext cx="7772400" cy="769685"/>
-          </a:xfrm>
-        </p:spPr>
-        <p:txBody>
-          <a:bodyPr/>
+            <a:ext cx="7772400" cy="553661"/>
+          </a:xfrm>
+        </p:spPr>
+        <p:txBody>
+          <a:bodyPr>
+            <a:normAutofit fontScale="90000"/>
+          </a:bodyPr>
           <a:lstStyle/>
           <a:p>
             <a:r>
               <a:rPr lang="fr-FR" dirty="0" smtClean="0"/>
-              <a:t>Ecrans du jeu</a:t>
+              <a:t>Ecrans </a:t>
+            </a:r>
+            <a:r>
+              <a:rPr lang="fr-FR" dirty="0" smtClean="0"/>
+              <a:t>du site</a:t>
             </a:r>
             <a:endParaRPr lang="fr-FR" dirty="0"/>
           </a:p>
@@ -3140,18 +3147,97 @@
         <p:spPr>
           <a:xfrm>
             <a:off x="1420122" y="1844824"/>
-            <a:ext cx="6400800" cy="4104456"/>
+            <a:ext cx="6400800" cy="4824536"/>
           </a:xfrm>
         </p:spPr>
         <p:txBody>
           <a:bodyPr>
-            <a:normAutofit fontScale="55000" lnSpcReduction="20000"/>
+            <a:normAutofit fontScale="40000" lnSpcReduction="20000"/>
           </a:bodyPr>
           <a:lstStyle/>
           <a:p>
             <a:r>
               <a:rPr lang="fr-FR" b="1" dirty="0" smtClean="0"/>
-              <a:t>Page d’accueil (login) redirection vers /</a:t>
+              <a:t>Header = Logo + </a:t>
+            </a:r>
+            <a:r>
+              <a:rPr lang="fr-FR" b="1" dirty="0" err="1" smtClean="0"/>
+              <a:t>Form</a:t>
+            </a:r>
+            <a:r>
+              <a:rPr lang="fr-FR" b="1" dirty="0" smtClean="0"/>
+              <a:t> login ou </a:t>
+            </a:r>
+            <a:r>
+              <a:rPr lang="fr-FR" b="1" dirty="0" err="1" smtClean="0"/>
+              <a:t>Username</a:t>
+            </a:r>
+            <a:endParaRPr lang="fr-FR" b="1" dirty="0" smtClean="0"/>
+          </a:p>
+          <a:p>
+            <a:r>
+              <a:rPr lang="fr-FR" b="1" dirty="0" err="1" smtClean="0"/>
+              <a:t>Footer</a:t>
+            </a:r>
+            <a:r>
+              <a:rPr lang="fr-FR" b="1" dirty="0" smtClean="0"/>
+              <a:t> = Zones infos (règles du jeu, crédits,  …)</a:t>
+            </a:r>
+          </a:p>
+          <a:p>
+            <a:endParaRPr lang="fr-FR" b="1" dirty="0" smtClean="0"/>
+          </a:p>
+          <a:p>
+            <a:r>
+              <a:rPr lang="fr-FR" b="1" dirty="0" smtClean="0"/>
+              <a:t>Page </a:t>
+            </a:r>
+            <a:r>
+              <a:rPr lang="fr-FR" b="1" dirty="0" smtClean="0"/>
+              <a:t>d’accueil </a:t>
+            </a:r>
+            <a:r>
+              <a:rPr lang="fr-FR" b="1" dirty="0" smtClean="0"/>
+              <a:t>(Header + </a:t>
+            </a:r>
+            <a:r>
+              <a:rPr lang="fr-FR" b="1" dirty="0"/>
+              <a:t>Z</a:t>
+            </a:r>
+            <a:r>
+              <a:rPr lang="fr-FR" b="1" dirty="0" smtClean="0"/>
+              <a:t>one principale (liste des </a:t>
+            </a:r>
+            <a:r>
+              <a:rPr lang="fr-FR" b="1" dirty="0" err="1" smtClean="0"/>
+              <a:t>games</a:t>
+            </a:r>
+            <a:r>
+              <a:rPr lang="fr-FR" b="1" dirty="0" smtClean="0"/>
+              <a:t>) + zone infos)</a:t>
+            </a:r>
+            <a:endParaRPr lang="fr-FR" b="1" dirty="0" smtClean="0"/>
+          </a:p>
+          <a:p>
+            <a:r>
+              <a:rPr lang="fr-FR" dirty="0" smtClean="0"/>
+              <a:t>/</a:t>
+            </a:r>
+          </a:p>
+          <a:p>
+            <a:endParaRPr lang="fr-FR" dirty="0"/>
+          </a:p>
+          <a:p>
+            <a:endParaRPr lang="fr-FR" b="1" dirty="0"/>
+          </a:p>
+          <a:p>
+            <a:r>
+              <a:rPr lang="fr-FR" b="1" dirty="0"/>
+              <a:t>Page </a:t>
+            </a:r>
+            <a:r>
+              <a:rPr lang="fr-FR" b="1" dirty="0" smtClean="0"/>
+              <a:t>détails d’une </a:t>
             </a:r>
             <a:r>
               <a:rPr lang="fr-FR" b="1" dirty="0" err="1" smtClean="0"/>
@@ -3159,25 +3245,28 @@
             </a:r>
             <a:r>
               <a:rPr lang="fr-FR" b="1" dirty="0" smtClean="0"/>
-              <a:t> si déjà connecté</a:t>
-            </a:r>
-          </a:p>
-          <a:p>
-            <a:r>
-              <a:rPr lang="fr-FR" dirty="0"/>
-              <a:t>/</a:t>
-            </a:r>
-            <a:endParaRPr lang="fr-FR" dirty="0" smtClean="0"/>
-          </a:p>
-          <a:p>
-            <a:endParaRPr lang="fr-FR" dirty="0" smtClean="0"/>
-          </a:p>
-          <a:p>
-            <a:r>
-              <a:rPr lang="fr-FR" b="1" smtClean="0"/>
-              <a:t>Page du Jeu</a:t>
-            </a:r>
-            <a:endParaRPr lang="fr-FR" b="1" dirty="0" smtClean="0"/>
+              <a:t> (Header </a:t>
+            </a:r>
+            <a:r>
+              <a:rPr lang="fr-FR" b="1" dirty="0"/>
+              <a:t>+ Zone principale </a:t>
+            </a:r>
+            <a:r>
+              <a:rPr lang="fr-FR" b="1" dirty="0" smtClean="0"/>
+              <a:t>(détails de la </a:t>
+            </a:r>
+            <a:r>
+              <a:rPr lang="fr-FR" b="1" dirty="0" err="1" smtClean="0"/>
+              <a:t>game</a:t>
+            </a:r>
+            <a:r>
+              <a:rPr lang="fr-FR" b="1" dirty="0" smtClean="0"/>
+              <a:t>) </a:t>
+            </a:r>
+            <a:r>
+              <a:rPr lang="fr-FR" b="1" dirty="0"/>
+              <a:t>+ zone infos)</a:t>
+            </a:r>
           </a:p>
           <a:p>
             <a:r>
@@ -3186,8 +3275,15 @@
             </a:r>
             <a:r>
               <a:rPr lang="fr-FR" dirty="0" err="1" smtClean="0"/>
-              <a:t>game</a:t>
-            </a:r>
+              <a:t>detail</a:t>
+            </a:r>
+            <a:r>
+              <a:rPr lang="fr-FR" dirty="0" smtClean="0"/>
+              <a:t>{id}</a:t>
+            </a:r>
+            <a:endParaRPr lang="fr-FR" dirty="0"/>
+          </a:p>
+          <a:p>
             <a:endParaRPr lang="fr-FR" dirty="0" smtClean="0"/>
           </a:p>
           <a:p>
@@ -3196,7 +3292,7 @@
           <a:p>
             <a:r>
               <a:rPr lang="fr-FR" b="1" dirty="0" smtClean="0"/>
-              <a:t>Page Récupération du mot de passe</a:t>
+              <a:t>Page du jeu (Sans menu, juste un cadre avec le jeu)</a:t>
             </a:r>
           </a:p>
           <a:p>
@@ -3206,6 +3302,55 @@
             </a:r>
             <a:r>
               <a:rPr lang="fr-FR" dirty="0" err="1" smtClean="0"/>
+              <a:t>game</a:t>
+            </a:r>
+            <a:endParaRPr lang="fr-FR" dirty="0" smtClean="0"/>
+          </a:p>
+          <a:p>
+            <a:endParaRPr lang="fr-FR" dirty="0"/>
+          </a:p>
+          <a:p>
+            <a:r>
+              <a:rPr lang="fr-FR" b="1" dirty="0" smtClean="0"/>
+              <a:t>Page Récupération du mot de </a:t>
+            </a:r>
+            <a:r>
+              <a:rPr lang="fr-FR" b="1" dirty="0" smtClean="0"/>
+              <a:t>passe (header + zone avec </a:t>
+            </a:r>
+            <a:r>
+              <a:rPr lang="fr-FR" b="1" dirty="0" err="1" smtClean="0"/>
+              <a:t>form</a:t>
+            </a:r>
+            <a:r>
+              <a:rPr lang="fr-FR" b="1" dirty="0" smtClean="0"/>
+              <a:t> de </a:t>
+            </a:r>
+            <a:r>
+              <a:rPr lang="fr-FR" b="1" dirty="0" err="1" smtClean="0"/>
+              <a:t>recup</a:t>
+            </a:r>
+            <a:r>
+              <a:rPr lang="fr-FR" b="1" dirty="0" smtClean="0"/>
+              <a:t> + </a:t>
+            </a:r>
+            <a:r>
+              <a:rPr lang="fr-FR" b="1" dirty="0" err="1" smtClean="0"/>
+              <a:t>footer</a:t>
+            </a:r>
+            <a:r>
+              <a:rPr lang="fr-FR" b="1" dirty="0" smtClean="0"/>
+              <a:t>)</a:t>
+            </a:r>
+            <a:endParaRPr lang="fr-FR" b="1" dirty="0" smtClean="0"/>
+          </a:p>
+          <a:p>
+            <a:r>
+              <a:rPr lang="fr-FR" dirty="0" smtClean="0"/>
+              <a:t>/</a:t>
+            </a:r>
+            <a:r>
+              <a:rPr lang="fr-FR" dirty="0" err="1" smtClean="0"/>
               <a:t>lost-password</a:t>
             </a:r>
             <a:endParaRPr lang="fr-FR" dirty="0" smtClean="0"/>
@@ -3222,7 +3367,7 @@
           <a:p>
             <a:r>
               <a:rPr lang="fr-FR" dirty="0" smtClean="0"/>
-              <a:t>/</a:t>
+              <a:t>/login/</a:t>
             </a:r>
             <a:r>
               <a:rPr lang="fr-FR" dirty="0" err="1" smtClean="0"/>
@@ -3236,8 +3381,13 @@
           <a:p>
             <a:r>
               <a:rPr lang="fr-FR" b="1" dirty="0" smtClean="0"/>
-              <a:t>Page déconnection</a:t>
-            </a:r>
+              <a:t>Page </a:t>
+            </a:r>
+            <a:r>
+              <a:rPr lang="fr-FR" b="1" dirty="0" smtClean="0"/>
+              <a:t>déconnection (redirection vers /)</a:t>
+            </a:r>
+            <a:endParaRPr lang="fr-FR" b="1" dirty="0" smtClean="0"/>
           </a:p>
           <a:p>
             <a:r>
@@ -3248,24 +3398,6 @@
               <a:rPr lang="fr-FR" dirty="0" err="1" smtClean="0"/>
               <a:t>logout</a:t>
             </a:r>
-            <a:endParaRPr lang="fr-FR" dirty="0" smtClean="0"/>
-          </a:p>
-          <a:p>
-            <a:endParaRPr lang="fr-FR" dirty="0" smtClean="0"/>
-          </a:p>
-          <a:p>
-            <a:endParaRPr lang="fr-FR" dirty="0"/>
-          </a:p>
-          <a:p>
-            <a:endParaRPr lang="fr-FR" dirty="0" smtClean="0"/>
-          </a:p>
-          <a:p>
-            <a:endParaRPr lang="fr-FR" dirty="0"/>
-          </a:p>
-          <a:p>
-            <a:endParaRPr lang="fr-FR" dirty="0" smtClean="0"/>
-          </a:p>
-          <a:p>
             <a:endParaRPr lang="fr-FR" dirty="0"/>
           </a:p>
         </p:txBody>
@@ -3333,37 +3465,79 @@
       </p:grpSpPr>
       <p:sp>
         <p:nvSpPr>
-          <p:cNvPr id="2" name="Titre 1"/>
-          <p:cNvSpPr>
-            <a:spLocks noGrp="1"/>
-          </p:cNvSpPr>
-          <p:nvPr>
-            <p:ph type="title"/>
-          </p:nvPr>
-        </p:nvSpPr>
-        <p:spPr/>
-        <p:txBody>
-          <a:bodyPr/>
-          <a:lstStyle/>
-          <a:p>
-            <a:r>
-              <a:rPr lang="fr-FR" dirty="0" smtClean="0"/>
-              <a:t>Ecran de login</a:t>
-            </a:r>
-            <a:endParaRPr lang="fr-FR" dirty="0"/>
-          </a:p>
-        </p:txBody>
-      </p:sp>
-      <p:sp>
-        <p:nvSpPr>
-          <p:cNvPr id="4" name="Rectangle 3"/>
+          <p:cNvPr id="15" name="Rectangle à coins arrondis 14"/>
           <p:cNvSpPr/>
           <p:nvPr/>
         </p:nvSpPr>
         <p:spPr>
           <a:xfrm>
-            <a:off x="2843808" y="2204864"/>
-            <a:ext cx="3528392" cy="360040"/>
+            <a:off x="1475656" y="5157192"/>
+            <a:ext cx="6261175" cy="1017404"/>
+          </a:xfrm>
+          <a:prstGeom prst="roundRect">
+            <a:avLst/>
+          </a:prstGeom>
+        </p:spPr>
+        <p:style>
+          <a:lnRef idx="2">
+            <a:schemeClr val="accent6"/>
+          </a:lnRef>
+          <a:fillRef idx="1">
+            <a:schemeClr val="lt1"/>
+          </a:fillRef>
+          <a:effectRef idx="0">
+            <a:schemeClr val="accent6"/>
+          </a:effectRef>
+          <a:fontRef idx="minor">
+            <a:schemeClr val="dk1"/>
+          </a:fontRef>
+        </p:style>
+        <p:txBody>
+          <a:bodyPr rtlCol="0" anchor="ctr"/>
+          <a:lstStyle/>
+          <a:p>
+            <a:pPr algn="ctr"/>
+            <a:endParaRPr lang="fr-FR"/>
+          </a:p>
+        </p:txBody>
+      </p:sp>
+      <p:sp>
+        <p:nvSpPr>
+          <p:cNvPr id="2" name="Titre 1"/>
+          <p:cNvSpPr>
+            <a:spLocks noGrp="1"/>
+          </p:cNvSpPr>
+          <p:nvPr>
+            <p:ph type="title"/>
+          </p:nvPr>
+        </p:nvSpPr>
+        <p:spPr/>
+        <p:txBody>
+          <a:bodyPr/>
+          <a:lstStyle/>
+          <a:p>
+            <a:r>
+              <a:rPr lang="fr-FR" dirty="0" smtClean="0"/>
+              <a:t>Ecran </a:t>
+            </a:r>
+            <a:r>
+              <a:rPr lang="fr-FR" dirty="0" err="1" smtClean="0"/>
+              <a:t>HomePage</a:t>
+            </a:r>
+            <a:endParaRPr lang="fr-FR" dirty="0"/>
+          </a:p>
+        </p:txBody>
+      </p:sp>
+      <p:sp>
+        <p:nvSpPr>
+          <p:cNvPr id="5" name="Rectangle 4"/>
+          <p:cNvSpPr/>
+          <p:nvPr/>
+        </p:nvSpPr>
+        <p:spPr>
+          <a:xfrm>
+            <a:off x="5796136" y="2220710"/>
+            <a:ext cx="1233903" cy="360040"/>
           </a:xfrm>
           <a:prstGeom prst="rect">
             <a:avLst/>
@@ -3394,30 +3568,122 @@
           <a:p>
             <a:pPr algn="ctr"/>
             <a:r>
-              <a:rPr lang="fr-FR" dirty="0" smtClean="0"/>
-              <a:t>Login</a:t>
-            </a:r>
-            <a:endParaRPr lang="fr-FR" dirty="0"/>
-          </a:p>
-        </p:txBody>
-      </p:sp>
-      <p:sp>
-        <p:nvSpPr>
-          <p:cNvPr id="5" name="Rectangle 4"/>
-          <p:cNvSpPr/>
+              <a:rPr lang="fr-FR" sz="1050" dirty="0" smtClean="0"/>
+              <a:t>Mot de passe</a:t>
+            </a:r>
+            <a:endParaRPr lang="fr-FR" sz="1050" dirty="0"/>
+          </a:p>
+        </p:txBody>
+      </p:sp>
+      <p:sp>
+        <p:nvSpPr>
+          <p:cNvPr id="7" name="ZoneTexte 6"/>
+          <p:cNvSpPr txBox="1"/>
           <p:nvPr/>
         </p:nvSpPr>
         <p:spPr>
           <a:xfrm>
-            <a:off x="2843808" y="2717304"/>
-            <a:ext cx="3528392" cy="360040"/>
+            <a:off x="6476691" y="3003546"/>
+            <a:ext cx="2520280" cy="338554"/>
           </a:xfrm>
           <a:prstGeom prst="rect">
             <a:avLst/>
           </a:prstGeom>
-          <a:solidFill>
-            <a:srgbClr val="92D050"/>
-          </a:solidFill>
+          <a:noFill/>
+        </p:spPr>
+        <p:txBody>
+          <a:bodyPr wrap="square" rtlCol="0">
+            <a:spAutoFit/>
+          </a:bodyPr>
+          <a:lstStyle/>
+          <a:p>
+            <a:pPr algn="r"/>
+            <a:r>
+              <a:rPr lang="fr-FR" sz="1600" b="1" u="sng" dirty="0" smtClean="0"/>
+              <a:t>Mot de passe oublié</a:t>
+            </a:r>
+            <a:endParaRPr lang="fr-FR" sz="1600" b="1" u="sng" dirty="0"/>
+          </a:p>
+        </p:txBody>
+      </p:sp>
+      <p:sp>
+        <p:nvSpPr>
+          <p:cNvPr id="8" name="ZoneTexte 7"/>
+          <p:cNvSpPr txBox="1"/>
+          <p:nvPr/>
+        </p:nvSpPr>
+        <p:spPr>
+          <a:xfrm>
+            <a:off x="3975612" y="1558533"/>
+            <a:ext cx="1311385" cy="307777"/>
+          </a:xfrm>
+          <a:prstGeom prst="rect">
+            <a:avLst/>
+          </a:prstGeom>
+          <a:noFill/>
+        </p:spPr>
+        <p:txBody>
+          <a:bodyPr wrap="none" rtlCol="0">
+            <a:spAutoFit/>
+          </a:bodyPr>
+          <a:lstStyle/>
+          <a:p>
+            <a:r>
+              <a:rPr lang="fr-FR" sz="1400" dirty="0" smtClean="0"/>
+              <a:t>Si </a:t>
+            </a:r>
+            <a:r>
+              <a:rPr lang="fr-FR" sz="1400" dirty="0" smtClean="0"/>
+              <a:t>pas connecté</a:t>
+            </a:r>
+            <a:endParaRPr lang="fr-FR" sz="1400" dirty="0"/>
+          </a:p>
+        </p:txBody>
+      </p:sp>
+      <p:sp>
+        <p:nvSpPr>
+          <p:cNvPr id="9" name="ZoneTexte 8"/>
+          <p:cNvSpPr txBox="1"/>
+          <p:nvPr/>
+        </p:nvSpPr>
+        <p:spPr>
+          <a:xfrm>
+            <a:off x="4211960" y="1156102"/>
+            <a:ext cx="838691" cy="369332"/>
+          </a:xfrm>
+          <a:prstGeom prst="rect">
+            <a:avLst/>
+          </a:prstGeom>
+          <a:noFill/>
+        </p:spPr>
+        <p:txBody>
+          <a:bodyPr wrap="none" rtlCol="0">
+            <a:spAutoFit/>
+          </a:bodyPr>
+          <a:lstStyle/>
+          <a:p>
+            <a:r>
+              <a:rPr lang="fr-FR" dirty="0" smtClean="0"/>
+              <a:t>(url : /)</a:t>
+            </a:r>
+            <a:endParaRPr lang="fr-FR" dirty="0"/>
+          </a:p>
+        </p:txBody>
+      </p:sp>
+      <p:sp>
+        <p:nvSpPr>
+          <p:cNvPr id="10" name="Rectangle 9"/>
+          <p:cNvSpPr/>
+          <p:nvPr/>
+        </p:nvSpPr>
+        <p:spPr>
+          <a:xfrm>
+            <a:off x="7164288" y="2222701"/>
+            <a:ext cx="948807" cy="360040"/>
+          </a:xfrm>
+          <a:prstGeom prst="rect">
+            <a:avLst/>
+          </a:prstGeom>
         </p:spPr>
         <p:style>
           <a:lnRef idx="2">
@@ -3441,23 +3707,23 @@
           <a:p>
             <a:pPr algn="ctr"/>
             <a:r>
-              <a:rPr lang="fr-FR" dirty="0" smtClean="0"/>
-              <a:t>Mot de passe</a:t>
-            </a:r>
-            <a:endParaRPr lang="fr-FR" dirty="0"/>
-          </a:p>
-        </p:txBody>
-      </p:sp>
-      <p:sp>
-        <p:nvSpPr>
-          <p:cNvPr id="7" name="ZoneTexte 6"/>
+              <a:rPr lang="fr-FR" sz="1200" dirty="0" smtClean="0"/>
+              <a:t>OK</a:t>
+            </a:r>
+            <a:endParaRPr lang="fr-FR" sz="1200" dirty="0"/>
+          </a:p>
+        </p:txBody>
+      </p:sp>
+      <p:sp>
+        <p:nvSpPr>
+          <p:cNvPr id="6" name="ZoneTexte 5"/>
           <p:cNvSpPr txBox="1"/>
           <p:nvPr/>
         </p:nvSpPr>
         <p:spPr>
           <a:xfrm>
-            <a:off x="3563888" y="4077072"/>
-            <a:ext cx="2520280" cy="369332"/>
+            <a:off x="7896430" y="2676796"/>
+            <a:ext cx="1179501" cy="338554"/>
           </a:xfrm>
           <a:prstGeom prst="rect">
             <a:avLst/>
@@ -3471,23 +3737,68 @@
           <a:lstStyle/>
           <a:p>
             <a:r>
-              <a:rPr lang="fr-FR" u="sng" dirty="0" smtClean="0"/>
-              <a:t>Mot de passe oublié</a:t>
-            </a:r>
-            <a:endParaRPr lang="fr-FR" u="sng" dirty="0"/>
-          </a:p>
-        </p:txBody>
-      </p:sp>
-      <p:sp>
-        <p:nvSpPr>
-          <p:cNvPr id="8" name="ZoneTexte 7"/>
+              <a:rPr lang="fr-FR" sz="1600" b="1" u="sng" dirty="0" smtClean="0"/>
+              <a:t>Inscription</a:t>
+            </a:r>
+            <a:endParaRPr lang="fr-FR" sz="1600" b="1" u="sng" dirty="0"/>
+          </a:p>
+        </p:txBody>
+      </p:sp>
+      <p:sp>
+        <p:nvSpPr>
+          <p:cNvPr id="11" name="ZoneTexte 10"/>
           <p:cNvSpPr txBox="1"/>
           <p:nvPr/>
         </p:nvSpPr>
         <p:spPr>
           <a:xfrm>
-            <a:off x="3106699" y="1558533"/>
-            <a:ext cx="2709268" cy="523220"/>
+            <a:off x="8486181" y="2211418"/>
+            <a:ext cx="432048" cy="369332"/>
+          </a:xfrm>
+          <a:prstGeom prst="rect">
+            <a:avLst/>
+          </a:prstGeom>
+        </p:spPr>
+        <p:style>
+          <a:lnRef idx="2">
+            <a:schemeClr val="dk1"/>
+          </a:lnRef>
+          <a:fillRef idx="1">
+            <a:schemeClr val="lt1"/>
+          </a:fillRef>
+          <a:effectRef idx="0">
+            <a:schemeClr val="dk1"/>
+          </a:effectRef>
+          <a:fontRef idx="minor">
+            <a:schemeClr val="dk1"/>
+          </a:fontRef>
+        </p:style>
+        <p:txBody>
+          <a:bodyPr wrap="square" rtlCol="0">
+            <a:spAutoFit/>
+          </a:bodyPr>
+          <a:lstStyle/>
+          <a:p>
+            <a:r>
+              <a:rPr lang="fr-FR" dirty="0">
+                <a:sym typeface="Wingdings" pitchFamily="2" charset="2"/>
+              </a:rPr>
+              <a:t>↓</a:t>
+            </a:r>
+            <a:endParaRPr lang="fr-FR" dirty="0" smtClean="0"/>
+          </a:p>
+        </p:txBody>
+      </p:sp>
+      <p:sp>
+        <p:nvSpPr>
+          <p:cNvPr id="12" name="ZoneTexte 11"/>
+          <p:cNvSpPr txBox="1"/>
+          <p:nvPr/>
+        </p:nvSpPr>
+        <p:spPr>
+          <a:xfrm>
+            <a:off x="1115616" y="2220710"/>
+            <a:ext cx="1584176" cy="369332"/>
           </a:xfrm>
           <a:prstGeom prst="rect">
             <a:avLst/>
@@ -3495,73 +3806,213 @@
           <a:noFill/>
         </p:spPr>
         <p:txBody>
-          <a:bodyPr wrap="none" rtlCol="0">
+          <a:bodyPr wrap="square" rtlCol="0">
             <a:spAutoFit/>
           </a:bodyPr>
           <a:lstStyle/>
           <a:p>
             <a:r>
-              <a:rPr lang="fr-FR" sz="1400" dirty="0" smtClean="0"/>
-              <a:t>Si pas connecté</a:t>
-            </a:r>
-          </a:p>
-          <a:p>
-            <a:r>
-              <a:rPr lang="fr-FR" sz="1400" dirty="0" smtClean="0"/>
-              <a:t>Si connecté redirection vers /</a:t>
-            </a:r>
-            <a:r>
-              <a:rPr lang="fr-FR" sz="1400" dirty="0" err="1" smtClean="0"/>
-              <a:t>game</a:t>
-            </a:r>
-            <a:endParaRPr lang="fr-FR" sz="1400" dirty="0"/>
-          </a:p>
-        </p:txBody>
-      </p:sp>
-      <p:sp>
-        <p:nvSpPr>
-          <p:cNvPr id="9" name="ZoneTexte 8"/>
+              <a:rPr lang="fr-FR" dirty="0" smtClean="0"/>
+              <a:t>LOGO</a:t>
+            </a:r>
+            <a:endParaRPr lang="fr-FR" dirty="0"/>
+          </a:p>
+        </p:txBody>
+      </p:sp>
+      <p:sp>
+        <p:nvSpPr>
+          <p:cNvPr id="13" name="ZoneTexte 12"/>
           <p:cNvSpPr txBox="1"/>
           <p:nvPr/>
         </p:nvSpPr>
         <p:spPr>
           <a:xfrm>
-            <a:off x="4211960" y="1156102"/>
-            <a:ext cx="838691" cy="369332"/>
+            <a:off x="1234054" y="3673833"/>
+            <a:ext cx="6794501" cy="3139321"/>
           </a:xfrm>
           <a:prstGeom prst="rect">
             <a:avLst/>
           </a:prstGeom>
-          <a:noFill/>
-        </p:spPr>
-        <p:txBody>
-          <a:bodyPr wrap="none" rtlCol="0">
+        </p:spPr>
+        <p:style>
+          <a:lnRef idx="2">
+            <a:schemeClr val="dk1"/>
+          </a:lnRef>
+          <a:fillRef idx="1">
+            <a:schemeClr val="lt1"/>
+          </a:fillRef>
+          <a:effectRef idx="0">
+            <a:schemeClr val="dk1"/>
+          </a:effectRef>
+          <a:fontRef idx="minor">
+            <a:schemeClr val="dk1"/>
+          </a:fontRef>
+        </p:style>
+        <p:txBody>
+          <a:bodyPr wrap="square" rtlCol="0">
             <a:spAutoFit/>
           </a:bodyPr>
           <a:lstStyle/>
           <a:p>
             <a:r>
               <a:rPr lang="fr-FR" dirty="0" smtClean="0"/>
-              <a:t>(url : /)</a:t>
-            </a:r>
+              <a:t>LISTE DES JEUX</a:t>
+            </a:r>
+          </a:p>
+          <a:p>
             <a:endParaRPr lang="fr-FR" dirty="0"/>
           </a:p>
-        </p:txBody>
-      </p:sp>
-      <p:sp>
-        <p:nvSpPr>
-          <p:cNvPr id="10" name="Rectangle 9"/>
-          <p:cNvSpPr/>
+          <a:p>
+            <a:pPr algn="ctr"/>
+            <a:r>
+              <a:rPr lang="fr-FR" dirty="0" smtClean="0"/>
+              <a:t>Ma 1</a:t>
+            </a:r>
+            <a:r>
+              <a:rPr lang="fr-FR" baseline="30000" dirty="0" smtClean="0"/>
+              <a:t>ère</a:t>
+            </a:r>
+            <a:r>
+              <a:rPr lang="fr-FR" dirty="0" smtClean="0"/>
+              <a:t> </a:t>
+            </a:r>
+            <a:r>
+              <a:rPr lang="fr-FR" dirty="0" err="1" smtClean="0"/>
+              <a:t>game</a:t>
+            </a:r>
+            <a:r>
+              <a:rPr lang="fr-FR" dirty="0" smtClean="0"/>
+              <a:t>	3 joueurs inscrits / 4	</a:t>
+            </a:r>
+            <a:r>
+              <a:rPr lang="fr-FR" strike="sngStrike" dirty="0" smtClean="0"/>
+              <a:t>REJOINDRE</a:t>
+            </a:r>
+            <a:endParaRPr lang="fr-FR" strike="sngStrike" dirty="0"/>
+          </a:p>
+          <a:p>
+            <a:pPr algn="ctr"/>
+            <a:r>
+              <a:rPr lang="fr-FR" dirty="0" smtClean="0"/>
+              <a:t>Ma 2</a:t>
+            </a:r>
+            <a:r>
+              <a:rPr lang="fr-FR" baseline="30000" dirty="0" smtClean="0"/>
+              <a:t>ère</a:t>
+            </a:r>
+            <a:r>
+              <a:rPr lang="fr-FR" dirty="0" smtClean="0"/>
+              <a:t> </a:t>
+            </a:r>
+            <a:r>
+              <a:rPr lang="fr-FR" dirty="0" err="1"/>
+              <a:t>game</a:t>
+            </a:r>
+            <a:r>
+              <a:rPr lang="fr-FR" dirty="0"/>
+              <a:t>	</a:t>
+            </a:r>
+            <a:r>
+              <a:rPr lang="fr-FR" dirty="0" smtClean="0"/>
+              <a:t>2 </a:t>
+            </a:r>
+            <a:r>
+              <a:rPr lang="fr-FR" dirty="0"/>
+              <a:t>joueurs inscrits / 4	</a:t>
+            </a:r>
+            <a:r>
+              <a:rPr lang="fr-FR" strike="sngStrike" dirty="0" smtClean="0"/>
+              <a:t>REJOINDRE</a:t>
+            </a:r>
+            <a:endParaRPr lang="fr-FR" dirty="0"/>
+          </a:p>
+          <a:p>
+            <a:endParaRPr lang="fr-FR" dirty="0" smtClean="0"/>
+          </a:p>
+          <a:p>
+            <a:endParaRPr lang="fr-FR" dirty="0"/>
+          </a:p>
+          <a:p>
+            <a:endParaRPr lang="fr-FR" dirty="0" smtClean="0"/>
+          </a:p>
+          <a:p>
+            <a:endParaRPr lang="fr-FR" dirty="0"/>
+          </a:p>
+          <a:p>
+            <a:endParaRPr lang="fr-FR" dirty="0" smtClean="0"/>
+          </a:p>
+          <a:p>
+            <a:endParaRPr lang="fr-FR" dirty="0"/>
+          </a:p>
+          <a:p>
+            <a:endParaRPr lang="fr-FR" dirty="0"/>
+          </a:p>
+        </p:txBody>
+      </p:sp>
+      <p:sp>
+        <p:nvSpPr>
+          <p:cNvPr id="14" name="ZoneTexte 13"/>
+          <p:cNvSpPr txBox="1"/>
           <p:nvPr/>
         </p:nvSpPr>
         <p:spPr>
           <a:xfrm>
-            <a:off x="3851920" y="3356992"/>
-            <a:ext cx="1512168" cy="360040"/>
+            <a:off x="6300192" y="5481228"/>
+            <a:ext cx="1224136" cy="369332"/>
           </a:xfrm>
           <a:prstGeom prst="rect">
             <a:avLst/>
           </a:prstGeom>
+          <a:solidFill>
+            <a:schemeClr val="accent1">
+              <a:lumMod val="60000"/>
+              <a:lumOff val="40000"/>
+            </a:schemeClr>
+          </a:solidFill>
+        </p:spPr>
+        <p:style>
+          <a:lnRef idx="2">
+            <a:schemeClr val="dk1"/>
+          </a:lnRef>
+          <a:fillRef idx="1">
+            <a:schemeClr val="lt1"/>
+          </a:fillRef>
+          <a:effectRef idx="0">
+            <a:schemeClr val="dk1"/>
+          </a:effectRef>
+          <a:fontRef idx="minor">
+            <a:schemeClr val="dk1"/>
+          </a:fontRef>
+        </p:style>
+        <p:txBody>
+          <a:bodyPr wrap="square" rtlCol="0">
+            <a:spAutoFit/>
+          </a:bodyPr>
+          <a:lstStyle/>
+          <a:p>
+            <a:r>
+              <a:rPr lang="fr-FR" strike="sngStrike" dirty="0" smtClean="0"/>
+              <a:t>CRÉER</a:t>
+            </a:r>
+            <a:endParaRPr lang="fr-FR" strike="sngStrike" dirty="0"/>
+          </a:p>
+        </p:txBody>
+      </p:sp>
+      <p:sp>
+        <p:nvSpPr>
+          <p:cNvPr id="16" name="Rectangle à coins arrondis 15"/>
+          <p:cNvSpPr/>
+          <p:nvPr/>
+        </p:nvSpPr>
+        <p:spPr>
+          <a:xfrm>
+            <a:off x="1475656" y="5157192"/>
+            <a:ext cx="6261175" cy="1017404"/>
+          </a:xfrm>
+          <a:prstGeom prst="roundRect">
+            <a:avLst/>
+          </a:prstGeom>
+          <a:noFill/>
         </p:spPr>
         <p:style>
           <a:lnRef idx="2">
@@ -3584,9 +4035,178 @@
           <a:lstStyle/>
           <a:p>
             <a:pPr algn="ctr"/>
+            <a:endParaRPr lang="fr-FR"/>
+          </a:p>
+        </p:txBody>
+      </p:sp>
+      <p:sp>
+        <p:nvSpPr>
+          <p:cNvPr id="4" name="Rectangle 3"/>
+          <p:cNvSpPr/>
+          <p:nvPr/>
+        </p:nvSpPr>
+        <p:spPr>
+          <a:xfrm>
+            <a:off x="4474587" y="2226684"/>
+            <a:ext cx="1152128" cy="360040"/>
+          </a:xfrm>
+          <a:prstGeom prst="rect">
+            <a:avLst/>
+          </a:prstGeom>
+          <a:solidFill>
+            <a:srgbClr val="92D050"/>
+          </a:solidFill>
+        </p:spPr>
+        <p:style>
+          <a:lnRef idx="2">
+            <a:schemeClr val="accent1">
+              <a:shade val="50000"/>
+            </a:schemeClr>
+          </a:lnRef>
+          <a:fillRef idx="1">
+            <a:schemeClr val="accent1"/>
+          </a:fillRef>
+          <a:effectRef idx="0">
+            <a:schemeClr val="accent1"/>
+          </a:effectRef>
+          <a:fontRef idx="minor">
+            <a:schemeClr val="lt1"/>
+          </a:fontRef>
+        </p:style>
+        <p:txBody>
+          <a:bodyPr rtlCol="0" anchor="ctr"/>
+          <a:lstStyle/>
+          <a:p>
+            <a:pPr algn="ctr"/>
+            <a:r>
+              <a:rPr lang="fr-FR" sz="1200" dirty="0" smtClean="0"/>
+              <a:t>Login</a:t>
+            </a:r>
+            <a:endParaRPr lang="fr-FR" sz="1200" dirty="0"/>
+          </a:p>
+        </p:txBody>
+      </p:sp>
+      <p:sp>
+        <p:nvSpPr>
+          <p:cNvPr id="18" name="Rectangle 17"/>
+          <p:cNvSpPr/>
+          <p:nvPr/>
+        </p:nvSpPr>
+        <p:spPr>
+          <a:xfrm>
+            <a:off x="1703678" y="5481228"/>
+            <a:ext cx="1500170" cy="360040"/>
+          </a:xfrm>
+          <a:prstGeom prst="rect">
+            <a:avLst/>
+          </a:prstGeom>
+          <a:solidFill>
+            <a:srgbClr val="92D050"/>
+          </a:solidFill>
+        </p:spPr>
+        <p:style>
+          <a:lnRef idx="2">
+            <a:schemeClr val="accent1">
+              <a:shade val="50000"/>
+            </a:schemeClr>
+          </a:lnRef>
+          <a:fillRef idx="1">
+            <a:schemeClr val="accent1"/>
+          </a:fillRef>
+          <a:effectRef idx="0">
+            <a:schemeClr val="accent1"/>
+          </a:effectRef>
+          <a:fontRef idx="minor">
+            <a:schemeClr val="lt1"/>
+          </a:fontRef>
+        </p:style>
+        <p:txBody>
+          <a:bodyPr rtlCol="0" anchor="ctr"/>
+          <a:lstStyle/>
+          <a:p>
+            <a:pPr algn="ctr"/>
+            <a:r>
+              <a:rPr lang="fr-FR" sz="1200" dirty="0" smtClean="0"/>
+              <a:t>Nom de la </a:t>
+            </a:r>
+            <a:r>
+              <a:rPr lang="fr-FR" sz="1200" dirty="0" err="1" smtClean="0"/>
+              <a:t>game</a:t>
+            </a:r>
+            <a:endParaRPr lang="fr-FR" sz="1200" dirty="0"/>
+          </a:p>
+        </p:txBody>
+      </p:sp>
+      <p:sp>
+        <p:nvSpPr>
+          <p:cNvPr id="19" name="ZoneTexte 18"/>
+          <p:cNvSpPr txBox="1"/>
+          <p:nvPr/>
+        </p:nvSpPr>
+        <p:spPr>
+          <a:xfrm>
+            <a:off x="4532375" y="5452909"/>
+            <a:ext cx="754622" cy="369332"/>
+          </a:xfrm>
+          <a:prstGeom prst="rect">
+            <a:avLst/>
+          </a:prstGeom>
+        </p:spPr>
+        <p:style>
+          <a:lnRef idx="2">
+            <a:schemeClr val="dk1"/>
+          </a:lnRef>
+          <a:fillRef idx="1">
+            <a:schemeClr val="lt1"/>
+          </a:fillRef>
+          <a:effectRef idx="0">
+            <a:schemeClr val="dk1"/>
+          </a:effectRef>
+          <a:fontRef idx="minor">
+            <a:schemeClr val="dk1"/>
+          </a:fontRef>
+        </p:style>
+        <p:txBody>
+          <a:bodyPr wrap="square" rtlCol="0">
+            <a:spAutoFit/>
+          </a:bodyPr>
+          <a:lstStyle/>
+          <a:p>
+            <a:r>
+              <a:rPr lang="fr-FR" dirty="0" smtClean="0">
+                <a:sym typeface="Wingdings" pitchFamily="2" charset="2"/>
+              </a:rPr>
+              <a:t>1↓</a:t>
+            </a:r>
+            <a:endParaRPr lang="fr-FR" dirty="0" smtClean="0"/>
+          </a:p>
+        </p:txBody>
+      </p:sp>
+      <p:sp>
+        <p:nvSpPr>
+          <p:cNvPr id="22" name="ZoneTexte 21"/>
+          <p:cNvSpPr txBox="1"/>
+          <p:nvPr/>
+        </p:nvSpPr>
+        <p:spPr>
+          <a:xfrm>
+            <a:off x="3356514" y="5471936"/>
+            <a:ext cx="2079582" cy="369332"/>
+          </a:xfrm>
+          <a:prstGeom prst="rect">
+            <a:avLst/>
+          </a:prstGeom>
+          <a:noFill/>
+        </p:spPr>
+        <p:txBody>
+          <a:bodyPr wrap="square" rtlCol="0">
+            <a:spAutoFit/>
+          </a:bodyPr>
+          <a:lstStyle/>
+          <a:p>
             <a:r>
               <a:rPr lang="fr-FR" dirty="0" smtClean="0"/>
-              <a:t>OK</a:t>
+              <a:t>Nb Joueurs</a:t>
             </a:r>
             <a:endParaRPr lang="fr-FR" dirty="0"/>
           </a:p>
@@ -3639,7 +4259,343 @@
           <a:p>
             <a:r>
               <a:rPr lang="fr-FR" dirty="0" smtClean="0"/>
-              <a:t>Ecran du jeu (/</a:t>
+              <a:t>Ecran </a:t>
+            </a:r>
+            <a:r>
+              <a:rPr lang="fr-FR" dirty="0" err="1" smtClean="0"/>
+              <a:t>HomePage</a:t>
+            </a:r>
+            <a:endParaRPr lang="fr-FR" dirty="0"/>
+          </a:p>
+        </p:txBody>
+      </p:sp>
+      <p:sp>
+        <p:nvSpPr>
+          <p:cNvPr id="7" name="ZoneTexte 6"/>
+          <p:cNvSpPr txBox="1"/>
+          <p:nvPr/>
+        </p:nvSpPr>
+        <p:spPr>
+          <a:xfrm>
+            <a:off x="6476691" y="3003546"/>
+            <a:ext cx="2520280" cy="338554"/>
+          </a:xfrm>
+          <a:prstGeom prst="rect">
+            <a:avLst/>
+          </a:prstGeom>
+          <a:noFill/>
+        </p:spPr>
+        <p:txBody>
+          <a:bodyPr wrap="square" rtlCol="0">
+            <a:spAutoFit/>
+          </a:bodyPr>
+          <a:lstStyle/>
+          <a:p>
+            <a:pPr algn="r"/>
+            <a:r>
+              <a:rPr lang="fr-FR" sz="1600" b="1" u="sng" dirty="0" smtClean="0"/>
+              <a:t>Profil</a:t>
+            </a:r>
+            <a:endParaRPr lang="fr-FR" sz="1600" b="1" u="sng" dirty="0"/>
+          </a:p>
+        </p:txBody>
+      </p:sp>
+      <p:sp>
+        <p:nvSpPr>
+          <p:cNvPr id="8" name="ZoneTexte 7"/>
+          <p:cNvSpPr txBox="1"/>
+          <p:nvPr/>
+        </p:nvSpPr>
+        <p:spPr>
+          <a:xfrm>
+            <a:off x="3975612" y="1558533"/>
+            <a:ext cx="1019638" cy="307777"/>
+          </a:xfrm>
+          <a:prstGeom prst="rect">
+            <a:avLst/>
+          </a:prstGeom>
+          <a:noFill/>
+        </p:spPr>
+        <p:txBody>
+          <a:bodyPr wrap="none" rtlCol="0">
+            <a:spAutoFit/>
+          </a:bodyPr>
+          <a:lstStyle/>
+          <a:p>
+            <a:r>
+              <a:rPr lang="fr-FR" sz="1400" dirty="0" smtClean="0"/>
+              <a:t>Si </a:t>
+            </a:r>
+            <a:r>
+              <a:rPr lang="fr-FR" sz="1400" dirty="0" smtClean="0"/>
+              <a:t>connecté</a:t>
+            </a:r>
+            <a:endParaRPr lang="fr-FR" sz="1400" dirty="0"/>
+          </a:p>
+        </p:txBody>
+      </p:sp>
+      <p:sp>
+        <p:nvSpPr>
+          <p:cNvPr id="9" name="ZoneTexte 8"/>
+          <p:cNvSpPr txBox="1"/>
+          <p:nvPr/>
+        </p:nvSpPr>
+        <p:spPr>
+          <a:xfrm>
+            <a:off x="4211960" y="1156102"/>
+            <a:ext cx="838691" cy="369332"/>
+          </a:xfrm>
+          <a:prstGeom prst="rect">
+            <a:avLst/>
+          </a:prstGeom>
+          <a:noFill/>
+        </p:spPr>
+        <p:txBody>
+          <a:bodyPr wrap="none" rtlCol="0">
+            <a:spAutoFit/>
+          </a:bodyPr>
+          <a:lstStyle/>
+          <a:p>
+            <a:r>
+              <a:rPr lang="fr-FR" dirty="0" smtClean="0"/>
+              <a:t>(url : /)</a:t>
+            </a:r>
+            <a:endParaRPr lang="fr-FR" dirty="0"/>
+          </a:p>
+        </p:txBody>
+      </p:sp>
+      <p:sp>
+        <p:nvSpPr>
+          <p:cNvPr id="6" name="ZoneTexte 5"/>
+          <p:cNvSpPr txBox="1"/>
+          <p:nvPr/>
+        </p:nvSpPr>
+        <p:spPr>
+          <a:xfrm>
+            <a:off x="7692799" y="2676796"/>
+            <a:ext cx="1321893" cy="338554"/>
+          </a:xfrm>
+          <a:prstGeom prst="rect">
+            <a:avLst/>
+          </a:prstGeom>
+          <a:noFill/>
+        </p:spPr>
+        <p:txBody>
+          <a:bodyPr wrap="square" rtlCol="0">
+            <a:spAutoFit/>
+          </a:bodyPr>
+          <a:lstStyle/>
+          <a:p>
+            <a:r>
+              <a:rPr lang="fr-FR" sz="1600" b="1" u="sng" dirty="0" smtClean="0"/>
+              <a:t>Déconnexion</a:t>
+            </a:r>
+            <a:endParaRPr lang="fr-FR" sz="1600" b="1" u="sng" dirty="0"/>
+          </a:p>
+        </p:txBody>
+      </p:sp>
+      <p:sp>
+        <p:nvSpPr>
+          <p:cNvPr id="11" name="ZoneTexte 10"/>
+          <p:cNvSpPr txBox="1"/>
+          <p:nvPr/>
+        </p:nvSpPr>
+        <p:spPr>
+          <a:xfrm>
+            <a:off x="8486181" y="2211418"/>
+            <a:ext cx="432048" cy="369332"/>
+          </a:xfrm>
+          <a:prstGeom prst="rect">
+            <a:avLst/>
+          </a:prstGeom>
+        </p:spPr>
+        <p:style>
+          <a:lnRef idx="2">
+            <a:schemeClr val="dk1"/>
+          </a:lnRef>
+          <a:fillRef idx="1">
+            <a:schemeClr val="lt1"/>
+          </a:fillRef>
+          <a:effectRef idx="0">
+            <a:schemeClr val="dk1"/>
+          </a:effectRef>
+          <a:fontRef idx="minor">
+            <a:schemeClr val="dk1"/>
+          </a:fontRef>
+        </p:style>
+        <p:txBody>
+          <a:bodyPr wrap="square" rtlCol="0">
+            <a:spAutoFit/>
+          </a:bodyPr>
+          <a:lstStyle/>
+          <a:p>
+            <a:r>
+              <a:rPr lang="fr-FR" dirty="0">
+                <a:sym typeface="Wingdings" pitchFamily="2" charset="2"/>
+              </a:rPr>
+              <a:t>↓</a:t>
+            </a:r>
+            <a:endParaRPr lang="fr-FR" dirty="0" smtClean="0"/>
+          </a:p>
+        </p:txBody>
+      </p:sp>
+      <p:sp>
+        <p:nvSpPr>
+          <p:cNvPr id="12" name="ZoneTexte 11"/>
+          <p:cNvSpPr txBox="1"/>
+          <p:nvPr/>
+        </p:nvSpPr>
+        <p:spPr>
+          <a:xfrm>
+            <a:off x="1115616" y="2220710"/>
+            <a:ext cx="1584176" cy="369332"/>
+          </a:xfrm>
+          <a:prstGeom prst="rect">
+            <a:avLst/>
+          </a:prstGeom>
+          <a:noFill/>
+        </p:spPr>
+        <p:txBody>
+          <a:bodyPr wrap="square" rtlCol="0">
+            <a:spAutoFit/>
+          </a:bodyPr>
+          <a:lstStyle/>
+          <a:p>
+            <a:r>
+              <a:rPr lang="fr-FR" dirty="0" smtClean="0"/>
+              <a:t>LOGO</a:t>
+            </a:r>
+            <a:endParaRPr lang="fr-FR" dirty="0"/>
+          </a:p>
+        </p:txBody>
+      </p:sp>
+      <p:sp>
+        <p:nvSpPr>
+          <p:cNvPr id="3" name="ZoneTexte 2"/>
+          <p:cNvSpPr txBox="1"/>
+          <p:nvPr/>
+        </p:nvSpPr>
+        <p:spPr>
+          <a:xfrm>
+            <a:off x="5508104" y="2072918"/>
+            <a:ext cx="1164101" cy="646331"/>
+          </a:xfrm>
+          <a:prstGeom prst="rect">
+            <a:avLst/>
+          </a:prstGeom>
+          <a:noFill/>
+        </p:spPr>
+        <p:txBody>
+          <a:bodyPr wrap="none" rtlCol="0">
+            <a:spAutoFit/>
+          </a:bodyPr>
+          <a:lstStyle/>
+          <a:p>
+            <a:r>
+              <a:rPr lang="fr-FR" b="1" dirty="0" err="1" smtClean="0"/>
+              <a:t>Username</a:t>
+            </a:r>
+            <a:endParaRPr lang="fr-FR" b="1" dirty="0" smtClean="0"/>
+          </a:p>
+          <a:p>
+            <a:endParaRPr lang="fr-FR" dirty="0"/>
+          </a:p>
+        </p:txBody>
+      </p:sp>
+      <p:sp>
+        <p:nvSpPr>
+          <p:cNvPr id="14" name="Rectangle à coins arrondis 13"/>
+          <p:cNvSpPr/>
+          <p:nvPr/>
+        </p:nvSpPr>
+        <p:spPr>
+          <a:xfrm>
+            <a:off x="1475656" y="5157192"/>
+            <a:ext cx="6261175" cy="1017404"/>
+          </a:xfrm>
+          <a:prstGeom prst="roundRect">
+            <a:avLst/>
+          </a:prstGeom>
+        </p:spPr>
+        <p:style>
+          <a:lnRef idx="2">
+            <a:schemeClr val="accent6"/>
+          </a:lnRef>
+          <a:fillRef idx="1">
+            <a:schemeClr val="lt1"/>
+          </a:fillRef>
+          <a:effectRef idx="0">
+            <a:schemeClr val="accent6"/>
+          </a:effectRef>
+          <a:fontRef idx="minor">
+            <a:schemeClr val="dk1"/>
+          </a:fontRef>
+        </p:style>
+        <p:txBody>
+          <a:bodyPr rtlCol="0" anchor="ctr"/>
+          <a:lstStyle/>
+          <a:p>
+            <a:pPr algn="ctr"/>
+            <a:endParaRPr lang="fr-FR"/>
+          </a:p>
+        </p:txBody>
+      </p:sp>
+      <p:sp>
+        <p:nvSpPr>
+          <p:cNvPr id="15" name="ZoneTexte 14"/>
+          <p:cNvSpPr txBox="1"/>
+          <p:nvPr/>
+        </p:nvSpPr>
+        <p:spPr>
+          <a:xfrm>
+            <a:off x="1234054" y="3673833"/>
+            <a:ext cx="6794501" cy="3139321"/>
+          </a:xfrm>
+          <a:prstGeom prst="rect">
+            <a:avLst/>
+          </a:prstGeom>
+        </p:spPr>
+        <p:style>
+          <a:lnRef idx="2">
+            <a:schemeClr val="dk1"/>
+          </a:lnRef>
+          <a:fillRef idx="1">
+            <a:schemeClr val="lt1"/>
+          </a:fillRef>
+          <a:effectRef idx="0">
+            <a:schemeClr val="dk1"/>
+          </a:effectRef>
+          <a:fontRef idx="minor">
+            <a:schemeClr val="dk1"/>
+          </a:fontRef>
+        </p:style>
+        <p:txBody>
+          <a:bodyPr wrap="square" rtlCol="0">
+            <a:spAutoFit/>
+          </a:bodyPr>
+          <a:lstStyle/>
+          <a:p>
+            <a:r>
+              <a:rPr lang="fr-FR" dirty="0" smtClean="0"/>
+              <a:t>LISTE DES JEUX</a:t>
+            </a:r>
+          </a:p>
+          <a:p>
+            <a:endParaRPr lang="fr-FR" dirty="0"/>
+          </a:p>
+          <a:p>
+            <a:pPr algn="ctr"/>
+            <a:r>
+              <a:rPr lang="fr-FR" dirty="0" smtClean="0"/>
+              <a:t>Ma 1</a:t>
+            </a:r>
+            <a:r>
+              <a:rPr lang="fr-FR" baseline="30000" dirty="0" smtClean="0"/>
+              <a:t>ère</a:t>
+            </a:r>
+            <a:r>
+              <a:rPr lang="fr-FR" dirty="0" smtClean="0"/>
+              <a:t> </a:t>
             </a:r>
             <a:r>
               <a:rPr lang="fr-FR" dirty="0" err="1" smtClean="0"/>
@@ -3647,35 +4603,476 @@
             </a:r>
             <a:r>
               <a:rPr lang="fr-FR" dirty="0" smtClean="0"/>
-              <a:t>)</a:t>
+              <a:t>	3 joueurs inscrits / 4	REJOINDRE</a:t>
             </a:r>
             <a:endParaRPr lang="fr-FR" dirty="0"/>
           </a:p>
-        </p:txBody>
-      </p:sp>
-      <p:sp>
-        <p:nvSpPr>
-          <p:cNvPr id="3" name="Espace réservé du contenu 2"/>
-          <p:cNvSpPr>
-            <a:spLocks noGrp="1"/>
-          </p:cNvSpPr>
-          <p:nvPr>
-            <p:ph idx="1"/>
-          </p:nvPr>
-        </p:nvSpPr>
-        <p:spPr/>
-        <p:txBody>
-          <a:bodyPr/>
-          <a:lstStyle/>
-          <a:p>
+          <a:p>
+            <a:pPr algn="ctr"/>
+            <a:r>
+              <a:rPr lang="fr-FR" dirty="0" smtClean="0"/>
+              <a:t>Ma 2</a:t>
+            </a:r>
+            <a:r>
+              <a:rPr lang="fr-FR" baseline="30000" dirty="0" smtClean="0"/>
+              <a:t>ère</a:t>
+            </a:r>
+            <a:r>
+              <a:rPr lang="fr-FR" dirty="0" smtClean="0"/>
+              <a:t> </a:t>
+            </a:r>
+            <a:r>
+              <a:rPr lang="fr-FR" dirty="0" err="1"/>
+              <a:t>game</a:t>
+            </a:r>
+            <a:r>
+              <a:rPr lang="fr-FR" dirty="0"/>
+              <a:t>	</a:t>
+            </a:r>
+            <a:r>
+              <a:rPr lang="fr-FR" dirty="0" smtClean="0"/>
+              <a:t>2 </a:t>
+            </a:r>
+            <a:r>
+              <a:rPr lang="fr-FR" dirty="0"/>
+              <a:t>joueurs inscrits / 4	</a:t>
+            </a:r>
+            <a:r>
+              <a:rPr lang="fr-FR" dirty="0" smtClean="0"/>
+              <a:t>REJOINDRE</a:t>
+            </a:r>
             <a:endParaRPr lang="fr-FR" dirty="0"/>
           </a:p>
-        </p:txBody>
-      </p:sp>
+          <a:p>
+            <a:endParaRPr lang="fr-FR" dirty="0" smtClean="0"/>
+          </a:p>
+          <a:p>
+            <a:endParaRPr lang="fr-FR" dirty="0"/>
+          </a:p>
+          <a:p>
+            <a:endParaRPr lang="fr-FR" dirty="0" smtClean="0"/>
+          </a:p>
+          <a:p>
+            <a:endParaRPr lang="fr-FR" dirty="0"/>
+          </a:p>
+          <a:p>
+            <a:endParaRPr lang="fr-FR" dirty="0" smtClean="0"/>
+          </a:p>
+          <a:p>
+            <a:endParaRPr lang="fr-FR" dirty="0"/>
+          </a:p>
+          <a:p>
+            <a:endParaRPr lang="fr-FR" dirty="0"/>
+          </a:p>
+        </p:txBody>
+      </p:sp>
+      <p:sp>
+        <p:nvSpPr>
+          <p:cNvPr id="16" name="ZoneTexte 15"/>
+          <p:cNvSpPr txBox="1"/>
+          <p:nvPr/>
+        </p:nvSpPr>
+        <p:spPr>
+          <a:xfrm>
+            <a:off x="6300192" y="5481228"/>
+            <a:ext cx="1224136" cy="369332"/>
+          </a:xfrm>
+          <a:prstGeom prst="rect">
+            <a:avLst/>
+          </a:prstGeom>
+          <a:solidFill>
+            <a:schemeClr val="accent1">
+              <a:lumMod val="60000"/>
+              <a:lumOff val="40000"/>
+            </a:schemeClr>
+          </a:solidFill>
+        </p:spPr>
+        <p:style>
+          <a:lnRef idx="2">
+            <a:schemeClr val="dk1"/>
+          </a:lnRef>
+          <a:fillRef idx="1">
+            <a:schemeClr val="lt1"/>
+          </a:fillRef>
+          <a:effectRef idx="0">
+            <a:schemeClr val="dk1"/>
+          </a:effectRef>
+          <a:fontRef idx="minor">
+            <a:schemeClr val="dk1"/>
+          </a:fontRef>
+        </p:style>
+        <p:txBody>
+          <a:bodyPr wrap="square" rtlCol="0">
+            <a:spAutoFit/>
+          </a:bodyPr>
+          <a:lstStyle/>
+          <a:p>
+            <a:r>
+              <a:rPr lang="fr-FR" dirty="0" smtClean="0"/>
+              <a:t>CRÉER</a:t>
+            </a:r>
+            <a:endParaRPr lang="fr-FR" dirty="0"/>
+          </a:p>
+        </p:txBody>
+      </p:sp>
+      <p:sp>
+        <p:nvSpPr>
+          <p:cNvPr id="17" name="Rectangle à coins arrondis 16"/>
+          <p:cNvSpPr/>
+          <p:nvPr/>
+        </p:nvSpPr>
+        <p:spPr>
+          <a:xfrm>
+            <a:off x="1475656" y="5157192"/>
+            <a:ext cx="6261175" cy="1017404"/>
+          </a:xfrm>
+          <a:prstGeom prst="roundRect">
+            <a:avLst/>
+          </a:prstGeom>
+          <a:noFill/>
+        </p:spPr>
+        <p:style>
+          <a:lnRef idx="2">
+            <a:schemeClr val="accent1">
+              <a:shade val="50000"/>
+            </a:schemeClr>
+          </a:lnRef>
+          <a:fillRef idx="1">
+            <a:schemeClr val="accent1"/>
+          </a:fillRef>
+          <a:effectRef idx="0">
+            <a:schemeClr val="accent1"/>
+          </a:effectRef>
+          <a:fontRef idx="minor">
+            <a:schemeClr val="lt1"/>
+          </a:fontRef>
+        </p:style>
+        <p:txBody>
+          <a:bodyPr rtlCol="0" anchor="ctr"/>
+          <a:lstStyle/>
+          <a:p>
+            <a:pPr algn="ctr"/>
+            <a:endParaRPr lang="fr-FR"/>
+          </a:p>
+        </p:txBody>
+      </p:sp>
+      <p:sp>
+        <p:nvSpPr>
+          <p:cNvPr id="18" name="Rectangle 17"/>
+          <p:cNvSpPr/>
+          <p:nvPr/>
+        </p:nvSpPr>
+        <p:spPr>
+          <a:xfrm>
+            <a:off x="1703678" y="5481228"/>
+            <a:ext cx="1500170" cy="360040"/>
+          </a:xfrm>
+          <a:prstGeom prst="rect">
+            <a:avLst/>
+          </a:prstGeom>
+          <a:solidFill>
+            <a:srgbClr val="92D050"/>
+          </a:solidFill>
+        </p:spPr>
+        <p:style>
+          <a:lnRef idx="2">
+            <a:schemeClr val="accent1">
+              <a:shade val="50000"/>
+            </a:schemeClr>
+          </a:lnRef>
+          <a:fillRef idx="1">
+            <a:schemeClr val="accent1"/>
+          </a:fillRef>
+          <a:effectRef idx="0">
+            <a:schemeClr val="accent1"/>
+          </a:effectRef>
+          <a:fontRef idx="minor">
+            <a:schemeClr val="lt1"/>
+          </a:fontRef>
+        </p:style>
+        <p:txBody>
+          <a:bodyPr rtlCol="0" anchor="ctr"/>
+          <a:lstStyle/>
+          <a:p>
+            <a:pPr algn="ctr"/>
+            <a:r>
+              <a:rPr lang="fr-FR" sz="1200" dirty="0" smtClean="0"/>
+              <a:t>Nom de la </a:t>
+            </a:r>
+            <a:r>
+              <a:rPr lang="fr-FR" sz="1200" dirty="0" err="1" smtClean="0"/>
+              <a:t>game</a:t>
+            </a:r>
+            <a:endParaRPr lang="fr-FR" sz="1200" dirty="0"/>
+          </a:p>
+        </p:txBody>
+      </p:sp>
+      <p:sp>
+        <p:nvSpPr>
+          <p:cNvPr id="19" name="ZoneTexte 18"/>
+          <p:cNvSpPr txBox="1"/>
+          <p:nvPr/>
+        </p:nvSpPr>
+        <p:spPr>
+          <a:xfrm>
+            <a:off x="4532375" y="5452909"/>
+            <a:ext cx="754622" cy="369332"/>
+          </a:xfrm>
+          <a:prstGeom prst="rect">
+            <a:avLst/>
+          </a:prstGeom>
+        </p:spPr>
+        <p:style>
+          <a:lnRef idx="2">
+            <a:schemeClr val="dk1"/>
+          </a:lnRef>
+          <a:fillRef idx="1">
+            <a:schemeClr val="lt1"/>
+          </a:fillRef>
+          <a:effectRef idx="0">
+            <a:schemeClr val="dk1"/>
+          </a:effectRef>
+          <a:fontRef idx="minor">
+            <a:schemeClr val="dk1"/>
+          </a:fontRef>
+        </p:style>
+        <p:txBody>
+          <a:bodyPr wrap="square" rtlCol="0">
+            <a:spAutoFit/>
+          </a:bodyPr>
+          <a:lstStyle/>
+          <a:p>
+            <a:r>
+              <a:rPr lang="fr-FR" dirty="0" smtClean="0">
+                <a:sym typeface="Wingdings" pitchFamily="2" charset="2"/>
+              </a:rPr>
+              <a:t>1↓</a:t>
+            </a:r>
+            <a:endParaRPr lang="fr-FR" dirty="0" smtClean="0"/>
+          </a:p>
+        </p:txBody>
+      </p:sp>
+      <p:sp>
+        <p:nvSpPr>
+          <p:cNvPr id="20" name="ZoneTexte 19"/>
+          <p:cNvSpPr txBox="1"/>
+          <p:nvPr/>
+        </p:nvSpPr>
+        <p:spPr>
+          <a:xfrm>
+            <a:off x="3356514" y="5471936"/>
+            <a:ext cx="2079582" cy="369332"/>
+          </a:xfrm>
+          <a:prstGeom prst="rect">
+            <a:avLst/>
+          </a:prstGeom>
+          <a:noFill/>
+        </p:spPr>
+        <p:txBody>
+          <a:bodyPr wrap="square" rtlCol="0">
+            <a:spAutoFit/>
+          </a:bodyPr>
+          <a:lstStyle/>
+          <a:p>
+            <a:r>
+              <a:rPr lang="fr-FR" dirty="0" smtClean="0"/>
+              <a:t>Nb Joueurs</a:t>
+            </a:r>
+            <a:endParaRPr lang="fr-FR" dirty="0"/>
+          </a:p>
+        </p:txBody>
+      </p:sp>
+      <p:cxnSp>
+        <p:nvCxnSpPr>
+          <p:cNvPr id="22" name="Connecteur droit avec flèche 21"/>
+          <p:cNvCxnSpPr/>
+          <p:nvPr/>
+        </p:nvCxnSpPr>
+        <p:spPr>
+          <a:xfrm>
+            <a:off x="7442503" y="4437112"/>
+            <a:ext cx="792088" cy="0"/>
+          </a:xfrm>
+          <a:prstGeom prst="straightConnector1">
+            <a:avLst/>
+          </a:prstGeom>
+          <a:ln>
+            <a:tailEnd type="arrow"/>
+          </a:ln>
+        </p:spPr>
+        <p:style>
+          <a:lnRef idx="1">
+            <a:schemeClr val="accent1"/>
+          </a:lnRef>
+          <a:fillRef idx="0">
+            <a:schemeClr val="accent1"/>
+          </a:fillRef>
+          <a:effectRef idx="0">
+            <a:schemeClr val="accent1"/>
+          </a:effectRef>
+          <a:fontRef idx="minor">
+            <a:schemeClr val="tx1"/>
+          </a:fontRef>
+        </p:style>
+      </p:cxnSp>
+      <p:sp>
+        <p:nvSpPr>
+          <p:cNvPr id="23" name="ZoneTexte 22"/>
+          <p:cNvSpPr txBox="1"/>
+          <p:nvPr/>
+        </p:nvSpPr>
+        <p:spPr>
+          <a:xfrm>
+            <a:off x="8201660" y="5342728"/>
+            <a:ext cx="2477281" cy="646331"/>
+          </a:xfrm>
+          <a:prstGeom prst="rect">
+            <a:avLst/>
+          </a:prstGeom>
+          <a:noFill/>
+        </p:spPr>
+        <p:txBody>
+          <a:bodyPr wrap="none" rtlCol="0">
+            <a:spAutoFit/>
+          </a:bodyPr>
+          <a:lstStyle/>
+          <a:p>
+            <a:r>
+              <a:rPr lang="fr-FR" dirty="0" err="1"/>
+              <a:t>Redirect</a:t>
+            </a:r>
+            <a:r>
+              <a:rPr lang="fr-FR" dirty="0"/>
+              <a:t> vers /</a:t>
+            </a:r>
+            <a:r>
+              <a:rPr lang="fr-FR" dirty="0" err="1"/>
+              <a:t>detail</a:t>
+            </a:r>
+            <a:r>
+              <a:rPr lang="fr-FR" dirty="0"/>
+              <a:t>/{id}</a:t>
+            </a:r>
+          </a:p>
+          <a:p>
+            <a:endParaRPr lang="fr-FR" dirty="0"/>
+          </a:p>
+        </p:txBody>
+      </p:sp>
+      <p:sp>
+        <p:nvSpPr>
+          <p:cNvPr id="24" name="ZoneTexte 23"/>
+          <p:cNvSpPr txBox="1"/>
+          <p:nvPr/>
+        </p:nvSpPr>
+        <p:spPr>
+          <a:xfrm>
+            <a:off x="8168846" y="4293096"/>
+            <a:ext cx="2477281" cy="646331"/>
+          </a:xfrm>
+          <a:prstGeom prst="rect">
+            <a:avLst/>
+          </a:prstGeom>
+          <a:noFill/>
+        </p:spPr>
+        <p:txBody>
+          <a:bodyPr wrap="none" rtlCol="0">
+            <a:spAutoFit/>
+          </a:bodyPr>
+          <a:lstStyle/>
+          <a:p>
+            <a:r>
+              <a:rPr lang="fr-FR" dirty="0" err="1"/>
+              <a:t>Redirect</a:t>
+            </a:r>
+            <a:r>
+              <a:rPr lang="fr-FR" dirty="0"/>
+              <a:t> vers /</a:t>
+            </a:r>
+            <a:r>
+              <a:rPr lang="fr-FR" dirty="0" err="1"/>
+              <a:t>detail</a:t>
+            </a:r>
+            <a:r>
+              <a:rPr lang="fr-FR" dirty="0"/>
+              <a:t>/{id}</a:t>
+            </a:r>
+          </a:p>
+          <a:p>
+            <a:endParaRPr lang="fr-FR" dirty="0"/>
+          </a:p>
+        </p:txBody>
+      </p:sp>
+      <p:cxnSp>
+        <p:nvCxnSpPr>
+          <p:cNvPr id="25" name="Connecteur droit avec flèche 24"/>
+          <p:cNvCxnSpPr/>
+          <p:nvPr/>
+        </p:nvCxnSpPr>
+        <p:spPr>
+          <a:xfrm>
+            <a:off x="7532712" y="5818294"/>
+            <a:ext cx="792088" cy="0"/>
+          </a:xfrm>
+          <a:prstGeom prst="straightConnector1">
+            <a:avLst/>
+          </a:prstGeom>
+          <a:ln>
+            <a:tailEnd type="arrow"/>
+          </a:ln>
+        </p:spPr>
+        <p:style>
+          <a:lnRef idx="1">
+            <a:schemeClr val="accent1"/>
+          </a:lnRef>
+          <a:fillRef idx="0">
+            <a:schemeClr val="accent1"/>
+          </a:fillRef>
+          <a:effectRef idx="0">
+            <a:schemeClr val="accent1"/>
+          </a:effectRef>
+          <a:fontRef idx="minor">
+            <a:schemeClr val="tx1"/>
+          </a:fontRef>
+        </p:style>
+      </p:cxnSp>
+      <p:cxnSp>
+        <p:nvCxnSpPr>
+          <p:cNvPr id="26" name="Connecteur droit avec flèche 25"/>
+          <p:cNvCxnSpPr/>
+          <p:nvPr/>
+        </p:nvCxnSpPr>
+        <p:spPr>
+          <a:xfrm>
+            <a:off x="7462352" y="4725144"/>
+            <a:ext cx="792088" cy="0"/>
+          </a:xfrm>
+          <a:prstGeom prst="straightConnector1">
+            <a:avLst/>
+          </a:prstGeom>
+          <a:ln>
+            <a:tailEnd type="arrow"/>
+          </a:ln>
+        </p:spPr>
+        <p:style>
+          <a:lnRef idx="1">
+            <a:schemeClr val="accent1"/>
+          </a:lnRef>
+          <a:fillRef idx="0">
+            <a:schemeClr val="accent1"/>
+          </a:fillRef>
+          <a:effectRef idx="0">
+            <a:schemeClr val="accent1"/>
+          </a:effectRef>
+          <a:fontRef idx="minor">
+            <a:schemeClr val="tx1"/>
+          </a:fontRef>
+        </p:style>
+      </p:cxnSp>
     </p:spTree>
     <p:extLst>
       <p:ext uri="{BB962C8B-B14F-4D97-AF65-F5344CB8AC3E}">
-        <p14:creationId xmlns:p14="http://schemas.microsoft.com/office/powerpoint/2010/main" val="860911130"/>
+        <p14:creationId xmlns:p14="http://schemas.microsoft.com/office/powerpoint/2010/main" val="832375003"/>
       </p:ext>
     </p:extLst>
   </p:cSld>
@@ -3704,7 +5101,7 @@
       </p:grpSpPr>
       <p:sp>
         <p:nvSpPr>
-          <p:cNvPr id="2" name="Titre 1"/>
+          <p:cNvPr id="4" name="Titre 1"/>
           <p:cNvSpPr>
             <a:spLocks noGrp="1"/>
           </p:cNvSpPr>
@@ -3712,44 +5109,465 @@
             <p:ph type="title"/>
           </p:nvPr>
         </p:nvSpPr>
-        <p:spPr/>
-        <p:txBody>
-          <a:bodyPr>
-            <a:normAutofit/>
+        <p:spPr>
+          <a:xfrm>
+            <a:off x="457200" y="274638"/>
+            <a:ext cx="8229600" cy="1143000"/>
+          </a:xfrm>
+        </p:spPr>
+        <p:txBody>
+          <a:bodyPr/>
+          <a:lstStyle/>
+          <a:p>
+            <a:r>
+              <a:rPr lang="fr-FR" dirty="0" smtClean="0"/>
+              <a:t>Ecran </a:t>
+            </a:r>
+            <a:r>
+              <a:rPr lang="fr-FR" dirty="0" smtClean="0"/>
+              <a:t>Game Détails</a:t>
+            </a:r>
+            <a:endParaRPr lang="fr-FR" dirty="0"/>
+          </a:p>
+        </p:txBody>
+      </p:sp>
+      <p:sp>
+        <p:nvSpPr>
+          <p:cNvPr id="5" name="ZoneTexte 4"/>
+          <p:cNvSpPr txBox="1"/>
+          <p:nvPr/>
+        </p:nvSpPr>
+        <p:spPr>
+          <a:xfrm>
+            <a:off x="6476691" y="3003546"/>
+            <a:ext cx="2520280" cy="338554"/>
+          </a:xfrm>
+          <a:prstGeom prst="rect">
+            <a:avLst/>
+          </a:prstGeom>
+          <a:noFill/>
+        </p:spPr>
+        <p:txBody>
+          <a:bodyPr wrap="square" rtlCol="0">
+            <a:spAutoFit/>
           </a:bodyPr>
           <a:lstStyle/>
           <a:p>
-            <a:r>
-              <a:rPr lang="fr-FR" sz="3600" dirty="0" smtClean="0"/>
-              <a:t>Ecran mot de passe oublié (/</a:t>
-            </a:r>
-            <a:r>
-              <a:rPr lang="fr-FR" sz="3600" dirty="0" err="1" smtClean="0"/>
-              <a:t>lost-password</a:t>
-            </a:r>
-            <a:r>
-              <a:rPr lang="fr-FR" sz="3600" dirty="0" smtClean="0"/>
-              <a:t>)</a:t>
-            </a:r>
-            <a:endParaRPr lang="fr-FR" sz="3600" dirty="0"/>
-          </a:p>
-        </p:txBody>
-      </p:sp>
-      <p:sp>
-        <p:nvSpPr>
-          <p:cNvPr id="3" name="Espace réservé du contenu 2"/>
-          <p:cNvSpPr>
-            <a:spLocks noGrp="1"/>
-          </p:cNvSpPr>
-          <p:nvPr>
-            <p:ph idx="1"/>
-          </p:nvPr>
-        </p:nvSpPr>
-        <p:spPr/>
-        <p:txBody>
-          <a:bodyPr/>
-          <a:lstStyle/>
-          <a:p>
+            <a:pPr algn="r"/>
+            <a:r>
+              <a:rPr lang="fr-FR" sz="1600" b="1" u="sng" dirty="0" smtClean="0"/>
+              <a:t>Profil</a:t>
+            </a:r>
+            <a:endParaRPr lang="fr-FR" sz="1600" b="1" u="sng" dirty="0"/>
+          </a:p>
+        </p:txBody>
+      </p:sp>
+      <p:sp>
+        <p:nvSpPr>
+          <p:cNvPr id="6" name="ZoneTexte 5"/>
+          <p:cNvSpPr txBox="1"/>
+          <p:nvPr/>
+        </p:nvSpPr>
+        <p:spPr>
+          <a:xfrm>
+            <a:off x="3975612" y="1558533"/>
+            <a:ext cx="1019638" cy="307777"/>
+          </a:xfrm>
+          <a:prstGeom prst="rect">
+            <a:avLst/>
+          </a:prstGeom>
+          <a:noFill/>
+        </p:spPr>
+        <p:txBody>
+          <a:bodyPr wrap="none" rtlCol="0">
+            <a:spAutoFit/>
+          </a:bodyPr>
+          <a:lstStyle/>
+          <a:p>
+            <a:r>
+              <a:rPr lang="fr-FR" sz="1400" dirty="0" smtClean="0"/>
+              <a:t>Si </a:t>
+            </a:r>
+            <a:r>
+              <a:rPr lang="fr-FR" sz="1400" dirty="0" smtClean="0"/>
+              <a:t>connecté</a:t>
+            </a:r>
+            <a:endParaRPr lang="fr-FR" sz="1400" dirty="0"/>
+          </a:p>
+        </p:txBody>
+      </p:sp>
+      <p:sp>
+        <p:nvSpPr>
+          <p:cNvPr id="7" name="ZoneTexte 6"/>
+          <p:cNvSpPr txBox="1"/>
+          <p:nvPr/>
+        </p:nvSpPr>
+        <p:spPr>
+          <a:xfrm>
+            <a:off x="4211960" y="1156102"/>
+            <a:ext cx="1774012" cy="369332"/>
+          </a:xfrm>
+          <a:prstGeom prst="rect">
+            <a:avLst/>
+          </a:prstGeom>
+          <a:noFill/>
+        </p:spPr>
+        <p:txBody>
+          <a:bodyPr wrap="none" rtlCol="0">
+            <a:spAutoFit/>
+          </a:bodyPr>
+          <a:lstStyle/>
+          <a:p>
+            <a:r>
+              <a:rPr lang="fr-FR" dirty="0" smtClean="0"/>
+              <a:t>(url : </a:t>
+            </a:r>
+            <a:r>
+              <a:rPr lang="fr-FR" dirty="0" smtClean="0"/>
+              <a:t>/</a:t>
+            </a:r>
+            <a:r>
+              <a:rPr lang="fr-FR" dirty="0" err="1" smtClean="0"/>
+              <a:t>detail</a:t>
+            </a:r>
+            <a:r>
+              <a:rPr lang="fr-FR" dirty="0" smtClean="0"/>
+              <a:t>/{id})</a:t>
+            </a:r>
+            <a:endParaRPr lang="fr-FR" dirty="0"/>
+          </a:p>
+        </p:txBody>
+      </p:sp>
+      <p:sp>
+        <p:nvSpPr>
+          <p:cNvPr id="8" name="ZoneTexte 7"/>
+          <p:cNvSpPr txBox="1"/>
+          <p:nvPr/>
+        </p:nvSpPr>
+        <p:spPr>
+          <a:xfrm>
+            <a:off x="7692799" y="2676796"/>
+            <a:ext cx="1321893" cy="338554"/>
+          </a:xfrm>
+          <a:prstGeom prst="rect">
+            <a:avLst/>
+          </a:prstGeom>
+          <a:noFill/>
+        </p:spPr>
+        <p:txBody>
+          <a:bodyPr wrap="square" rtlCol="0">
+            <a:spAutoFit/>
+          </a:bodyPr>
+          <a:lstStyle/>
+          <a:p>
+            <a:r>
+              <a:rPr lang="fr-FR" sz="1600" b="1" u="sng" dirty="0" smtClean="0"/>
+              <a:t>Déconnexion</a:t>
+            </a:r>
+            <a:endParaRPr lang="fr-FR" sz="1600" b="1" u="sng" dirty="0"/>
+          </a:p>
+        </p:txBody>
+      </p:sp>
+      <p:sp>
+        <p:nvSpPr>
+          <p:cNvPr id="9" name="ZoneTexte 8"/>
+          <p:cNvSpPr txBox="1"/>
+          <p:nvPr/>
+        </p:nvSpPr>
+        <p:spPr>
+          <a:xfrm>
+            <a:off x="8486181" y="2211418"/>
+            <a:ext cx="432048" cy="369332"/>
+          </a:xfrm>
+          <a:prstGeom prst="rect">
+            <a:avLst/>
+          </a:prstGeom>
+        </p:spPr>
+        <p:style>
+          <a:lnRef idx="2">
+            <a:schemeClr val="dk1"/>
+          </a:lnRef>
+          <a:fillRef idx="1">
+            <a:schemeClr val="lt1"/>
+          </a:fillRef>
+          <a:effectRef idx="0">
+            <a:schemeClr val="dk1"/>
+          </a:effectRef>
+          <a:fontRef idx="minor">
+            <a:schemeClr val="dk1"/>
+          </a:fontRef>
+        </p:style>
+        <p:txBody>
+          <a:bodyPr wrap="square" rtlCol="0">
+            <a:spAutoFit/>
+          </a:bodyPr>
+          <a:lstStyle/>
+          <a:p>
+            <a:r>
+              <a:rPr lang="fr-FR" dirty="0">
+                <a:sym typeface="Wingdings" pitchFamily="2" charset="2"/>
+              </a:rPr>
+              <a:t>↓</a:t>
+            </a:r>
+            <a:endParaRPr lang="fr-FR" dirty="0" smtClean="0"/>
+          </a:p>
+        </p:txBody>
+      </p:sp>
+      <p:sp>
+        <p:nvSpPr>
+          <p:cNvPr id="10" name="ZoneTexte 9"/>
+          <p:cNvSpPr txBox="1"/>
+          <p:nvPr/>
+        </p:nvSpPr>
+        <p:spPr>
+          <a:xfrm>
+            <a:off x="1115616" y="2220710"/>
+            <a:ext cx="1584176" cy="369332"/>
+          </a:xfrm>
+          <a:prstGeom prst="rect">
+            <a:avLst/>
+          </a:prstGeom>
+          <a:noFill/>
+        </p:spPr>
+        <p:txBody>
+          <a:bodyPr wrap="square" rtlCol="0">
+            <a:spAutoFit/>
+          </a:bodyPr>
+          <a:lstStyle/>
+          <a:p>
+            <a:r>
+              <a:rPr lang="fr-FR" dirty="0" smtClean="0"/>
+              <a:t>LOGO</a:t>
+            </a:r>
+            <a:endParaRPr lang="fr-FR" dirty="0"/>
+          </a:p>
+        </p:txBody>
+      </p:sp>
+      <p:sp>
+        <p:nvSpPr>
+          <p:cNvPr id="11" name="ZoneTexte 10"/>
+          <p:cNvSpPr txBox="1"/>
+          <p:nvPr/>
+        </p:nvSpPr>
+        <p:spPr>
+          <a:xfrm>
+            <a:off x="5508104" y="2072918"/>
+            <a:ext cx="1164101" cy="646331"/>
+          </a:xfrm>
+          <a:prstGeom prst="rect">
+            <a:avLst/>
+          </a:prstGeom>
+          <a:noFill/>
+        </p:spPr>
+        <p:txBody>
+          <a:bodyPr wrap="none" rtlCol="0">
+            <a:spAutoFit/>
+          </a:bodyPr>
+          <a:lstStyle/>
+          <a:p>
+            <a:r>
+              <a:rPr lang="fr-FR" b="1" dirty="0" err="1" smtClean="0"/>
+              <a:t>Username</a:t>
+            </a:r>
+            <a:endParaRPr lang="fr-FR" b="1" dirty="0" smtClean="0"/>
+          </a:p>
+          <a:p>
+            <a:endParaRPr lang="fr-FR" dirty="0"/>
+          </a:p>
+        </p:txBody>
+      </p:sp>
+      <p:sp>
+        <p:nvSpPr>
+          <p:cNvPr id="12" name="Rectangle à coins arrondis 11"/>
+          <p:cNvSpPr/>
+          <p:nvPr/>
+        </p:nvSpPr>
+        <p:spPr>
+          <a:xfrm>
+            <a:off x="1475656" y="5157192"/>
+            <a:ext cx="6261175" cy="1017404"/>
+          </a:xfrm>
+          <a:prstGeom prst="roundRect">
+            <a:avLst/>
+          </a:prstGeom>
+        </p:spPr>
+        <p:style>
+          <a:lnRef idx="2">
+            <a:schemeClr val="accent6"/>
+          </a:lnRef>
+          <a:fillRef idx="1">
+            <a:schemeClr val="lt1"/>
+          </a:fillRef>
+          <a:effectRef idx="0">
+            <a:schemeClr val="accent6"/>
+          </a:effectRef>
+          <a:fontRef idx="minor">
+            <a:schemeClr val="dk1"/>
+          </a:fontRef>
+        </p:style>
+        <p:txBody>
+          <a:bodyPr rtlCol="0" anchor="ctr"/>
+          <a:lstStyle/>
+          <a:p>
+            <a:pPr algn="ctr"/>
+            <a:endParaRPr lang="fr-FR"/>
+          </a:p>
+        </p:txBody>
+      </p:sp>
+      <p:sp>
+        <p:nvSpPr>
+          <p:cNvPr id="13" name="ZoneTexte 12"/>
+          <p:cNvSpPr txBox="1"/>
+          <p:nvPr/>
+        </p:nvSpPr>
+        <p:spPr>
+          <a:xfrm>
+            <a:off x="1234054" y="3673833"/>
+            <a:ext cx="6794501" cy="2769989"/>
+          </a:xfrm>
+          <a:prstGeom prst="rect">
+            <a:avLst/>
+          </a:prstGeom>
+        </p:spPr>
+        <p:style>
+          <a:lnRef idx="2">
+            <a:schemeClr val="dk1"/>
+          </a:lnRef>
+          <a:fillRef idx="1">
+            <a:schemeClr val="lt1"/>
+          </a:fillRef>
+          <a:effectRef idx="0">
+            <a:schemeClr val="dk1"/>
+          </a:effectRef>
+          <a:fontRef idx="minor">
+            <a:schemeClr val="dk1"/>
+          </a:fontRef>
+        </p:style>
+        <p:txBody>
+          <a:bodyPr wrap="square" rtlCol="0">
+            <a:spAutoFit/>
+          </a:bodyPr>
+          <a:lstStyle/>
+          <a:p>
+            <a:r>
+              <a:rPr lang="fr-FR" dirty="0" smtClean="0"/>
+              <a:t>DETAILS DU JEU</a:t>
+            </a:r>
+          </a:p>
+          <a:p>
+            <a:endParaRPr lang="fr-FR" dirty="0"/>
+          </a:p>
+          <a:p>
+            <a:pPr algn="ctr"/>
+            <a:r>
+              <a:rPr lang="fr-FR" dirty="0" smtClean="0"/>
+              <a:t>Ma 1</a:t>
+            </a:r>
+            <a:r>
+              <a:rPr lang="fr-FR" baseline="30000" dirty="0" smtClean="0"/>
+              <a:t>ère</a:t>
+            </a:r>
+            <a:r>
+              <a:rPr lang="fr-FR" dirty="0" smtClean="0"/>
+              <a:t> </a:t>
+            </a:r>
+            <a:r>
+              <a:rPr lang="fr-FR" dirty="0" err="1" smtClean="0"/>
+              <a:t>game</a:t>
+            </a:r>
+            <a:r>
+              <a:rPr lang="fr-FR" dirty="0" smtClean="0"/>
+              <a:t>	3 joueurs inscrits / 4</a:t>
+            </a:r>
+          </a:p>
+          <a:p>
+            <a:pPr algn="ctr"/>
+            <a:endParaRPr lang="fr-FR" dirty="0"/>
+          </a:p>
+          <a:p>
+            <a:pPr algn="ctr"/>
+            <a:r>
+              <a:rPr lang="fr-FR" dirty="0" smtClean="0"/>
+              <a:t>Mika</a:t>
+            </a:r>
+          </a:p>
+          <a:p>
+            <a:pPr algn="ctr"/>
+            <a:r>
+              <a:rPr lang="fr-FR" dirty="0" smtClean="0"/>
+              <a:t>Nicolas</a:t>
+            </a:r>
+          </a:p>
+          <a:p>
+            <a:pPr algn="ctr"/>
+            <a:r>
+              <a:rPr lang="fr-FR" dirty="0" smtClean="0"/>
+              <a:t>Niko</a:t>
+            </a:r>
+          </a:p>
+          <a:p>
+            <a:pPr algn="ctr"/>
+            <a:r>
+              <a:rPr lang="fr-FR" dirty="0" smtClean="0"/>
+              <a:t>	</a:t>
+            </a:r>
+          </a:p>
+          <a:p>
+            <a:r>
+              <a:rPr lang="fr-FR" sz="1200" dirty="0"/>
+              <a:t>Uniquement par le créateur</a:t>
+            </a:r>
+          </a:p>
+          <a:p>
+            <a:endParaRPr lang="fr-FR" dirty="0"/>
+          </a:p>
+        </p:txBody>
+      </p:sp>
+      <p:sp>
+        <p:nvSpPr>
+          <p:cNvPr id="14" name="ZoneTexte 13"/>
+          <p:cNvSpPr txBox="1"/>
+          <p:nvPr/>
+        </p:nvSpPr>
+        <p:spPr>
+          <a:xfrm>
+            <a:off x="3703103" y="5665894"/>
+            <a:ext cx="1856401" cy="369332"/>
+          </a:xfrm>
+          <a:prstGeom prst="rect">
+            <a:avLst/>
+          </a:prstGeom>
+          <a:solidFill>
+            <a:schemeClr val="accent1">
+              <a:lumMod val="60000"/>
+              <a:lumOff val="40000"/>
+            </a:schemeClr>
+          </a:solidFill>
+        </p:spPr>
+        <p:style>
+          <a:lnRef idx="2">
+            <a:schemeClr val="dk1"/>
+          </a:lnRef>
+          <a:fillRef idx="1">
+            <a:schemeClr val="lt1"/>
+          </a:fillRef>
+          <a:effectRef idx="0">
+            <a:schemeClr val="dk1"/>
+          </a:effectRef>
+          <a:fontRef idx="minor">
+            <a:schemeClr val="dk1"/>
+          </a:fontRef>
+        </p:style>
+        <p:txBody>
+          <a:bodyPr wrap="square" rtlCol="0">
+            <a:spAutoFit/>
+          </a:bodyPr>
+          <a:lstStyle/>
+          <a:p>
+            <a:r>
+              <a:rPr lang="fr-FR" dirty="0" smtClean="0"/>
+              <a:t>LANCER LA GAME</a:t>
+            </a:r>
             <a:endParaRPr lang="fr-FR" dirty="0"/>
           </a:p>
         </p:txBody>
@@ -3757,7 +5575,7 @@
     </p:spTree>
     <p:extLst>
       <p:ext uri="{BB962C8B-B14F-4D97-AF65-F5344CB8AC3E}">
-        <p14:creationId xmlns:p14="http://schemas.microsoft.com/office/powerpoint/2010/main" val="2518812306"/>
+        <p14:creationId xmlns:p14="http://schemas.microsoft.com/office/powerpoint/2010/main" val="658519950"/>
       </p:ext>
     </p:extLst>
   </p:cSld>
@@ -3796,12 +5614,98 @@
         </p:nvSpPr>
         <p:spPr/>
         <p:txBody>
+          <a:bodyPr>
+            <a:normAutofit/>
+          </a:bodyPr>
+          <a:lstStyle/>
+          <a:p>
+            <a:r>
+              <a:rPr lang="fr-FR" sz="3600" dirty="0" smtClean="0"/>
+              <a:t>Ecran mot de passe oublié (/</a:t>
+            </a:r>
+            <a:r>
+              <a:rPr lang="fr-FR" sz="3600" dirty="0" err="1" smtClean="0"/>
+              <a:t>lost-password</a:t>
+            </a:r>
+            <a:r>
+              <a:rPr lang="fr-FR" sz="3600" dirty="0" smtClean="0"/>
+              <a:t>)</a:t>
+            </a:r>
+            <a:endParaRPr lang="fr-FR" sz="3600" dirty="0"/>
+          </a:p>
+        </p:txBody>
+      </p:sp>
+      <p:sp>
+        <p:nvSpPr>
+          <p:cNvPr id="3" name="Espace réservé du contenu 2"/>
+          <p:cNvSpPr>
+            <a:spLocks noGrp="1"/>
+          </p:cNvSpPr>
+          <p:nvPr>
+            <p:ph idx="1"/>
+          </p:nvPr>
+        </p:nvSpPr>
+        <p:spPr/>
+        <p:txBody>
           <a:bodyPr/>
           <a:lstStyle/>
           <a:p>
+            <a:endParaRPr lang="fr-FR" dirty="0"/>
+          </a:p>
+        </p:txBody>
+      </p:sp>
+    </p:spTree>
+    <p:extLst>
+      <p:ext uri="{BB962C8B-B14F-4D97-AF65-F5344CB8AC3E}">
+        <p14:creationId xmlns:p14="http://schemas.microsoft.com/office/powerpoint/2010/main" val="2518812306"/>
+      </p:ext>
+    </p:extLst>
+  </p:cSld>
+  <p:clrMapOvr>
+    <a:masterClrMapping/>
+  </p:clrMapOvr>
+</p:sld>
+</file>
+
+<file path=ppt/slides/slide6.xml><?xml version="1.0" encoding="utf-8"?>
+<p:sld xmlns:a="http://schemas.openxmlformats.org/drawingml/2006/main" xmlns:r="http://schemas.openxmlformats.org/officeDocument/2006/relationships" xmlns:p="http://schemas.openxmlformats.org/presentationml/2006/main">
+  <p:cSld>
+    <p:spTree>
+      <p:nvGrpSpPr>
+        <p:cNvPr id="1" name=""/>
+        <p:cNvGrpSpPr/>
+        <p:nvPr/>
+      </p:nvGrpSpPr>
+      <p:grpSpPr>
+        <a:xfrm>
+          <a:off x="0" y="0"/>
+          <a:ext cx="0" cy="0"/>
+          <a:chOff x="0" y="0"/>
+          <a:chExt cx="0" cy="0"/>
+        </a:xfrm>
+      </p:grpSpPr>
+      <p:sp>
+        <p:nvSpPr>
+          <p:cNvPr id="2" name="Titre 1"/>
+          <p:cNvSpPr>
+            <a:spLocks noGrp="1"/>
+          </p:cNvSpPr>
+          <p:nvPr>
+            <p:ph type="title"/>
+          </p:nvPr>
+        </p:nvSpPr>
+        <p:spPr/>
+        <p:txBody>
+          <a:bodyPr/>
+          <a:lstStyle/>
+          <a:p>
             <a:r>
               <a:rPr lang="fr-FR" dirty="0" smtClean="0"/>
-              <a:t>Ecran inscription (/</a:t>
+              <a:t>Ecran inscription </a:t>
+            </a:r>
+            <a:r>
+              <a:rPr lang="fr-FR" dirty="0" smtClean="0"/>
+              <a:t>(/login/</a:t>
             </a:r>
             <a:r>
               <a:rPr lang="fr-FR" dirty="0" err="1" smtClean="0"/>

</xml_diff>